<commit_message>
Switching over to working on my desktop
</commit_message>
<xml_diff>
--- a/Git The Hard Way.pptx
+++ b/Git The Hard Way.pptx
@@ -6,7 +6,12 @@
   </p:sldMasterIdLst>
   <p:sldIdLst>
     <p:sldId id="256" r:id="rId2"/>
-    <p:sldId id="257" r:id="rId3"/>
+    <p:sldId id="259" r:id="rId3"/>
+    <p:sldId id="261" r:id="rId4"/>
+    <p:sldId id="257" r:id="rId5"/>
+    <p:sldId id="262" r:id="rId6"/>
+    <p:sldId id="260" r:id="rId7"/>
+    <p:sldId id="258" r:id="rId8"/>
   </p:sldIdLst>
   <p:sldSz cx="12192000" cy="6858000"/>
   <p:notesSz cx="7010400" cy="9296400"/>
@@ -15256,6 +15261,13 @@
   <p:transition spd="med">
     <p:wipe/>
   </p:transition>
+  <p:timing>
+    <p:tnLst>
+      <p:par>
+        <p:cTn id="1" dur="indefinite" restart="never" nodeType="tmRoot"/>
+      </p:par>
+    </p:tnLst>
+  </p:timing>
 </p:sld>
 </file>
 
@@ -15288,34 +15300,358 @@
         </p:nvSpPr>
         <p:spPr/>
         <p:txBody>
+          <a:bodyPr anchor="ctr">
+            <a:normAutofit/>
+          </a:bodyPr>
+          <a:lstStyle/>
+          <a:p>
+            <a:r>
+              <a:rPr lang="en-US" sz="2400" dirty="0" smtClean="0"/>
+              <a:t>Absolute beginners</a:t>
+            </a:r>
+          </a:p>
+          <a:p>
+            <a:r>
+              <a:rPr lang="en-US" sz="2400" dirty="0" smtClean="0"/>
+              <a:t>Those who want to learn how to properly merge</a:t>
+            </a:r>
+          </a:p>
+          <a:p>
+            <a:r>
+              <a:rPr lang="en-US" sz="2400" dirty="0" smtClean="0"/>
+              <a:t>Those who are not comfortable with command line </a:t>
+            </a:r>
+            <a:r>
+              <a:rPr lang="en-US" sz="2400" dirty="0" err="1" smtClean="0"/>
+              <a:t>git</a:t>
+            </a:r>
+            <a:endParaRPr lang="en-US" sz="2400" dirty="0" smtClean="0"/>
+          </a:p>
+        </p:txBody>
+      </p:sp>
+      <p:sp>
+        <p:nvSpPr>
+          <p:cNvPr id="3" name="Title 2"/>
+          <p:cNvSpPr>
+            <a:spLocks noGrp="1"/>
+          </p:cNvSpPr>
+          <p:nvPr>
+            <p:ph type="title"/>
+          </p:nvPr>
+        </p:nvSpPr>
+        <p:spPr/>
+        <p:txBody>
           <a:bodyPr/>
           <a:lstStyle/>
           <a:p>
             <a:r>
               <a:rPr lang="en-US" dirty="0" smtClean="0"/>
+              <a:t>Who This Is For</a:t>
+            </a:r>
+            <a:endParaRPr lang="en-US" dirty="0"/>
+          </a:p>
+        </p:txBody>
+      </p:sp>
+      <p:sp>
+        <p:nvSpPr>
+          <p:cNvPr id="4" name="Footer Placeholder 3"/>
+          <p:cNvSpPr>
+            <a:spLocks noGrp="1"/>
+          </p:cNvSpPr>
+          <p:nvPr>
+            <p:ph type="ftr" sz="quarter" idx="11"/>
+          </p:nvPr>
+        </p:nvSpPr>
+        <p:spPr/>
+        <p:txBody>
+          <a:bodyPr/>
+          <a:lstStyle/>
+          <a:p>
+            <a:r>
+              <a:rPr lang="en-US" smtClean="0"/>
+              <a:t>Silicon Labs Confidential</a:t>
+            </a:r>
+            <a:endParaRPr lang="en-US" dirty="0"/>
+          </a:p>
+        </p:txBody>
+      </p:sp>
+      <p:sp>
+        <p:nvSpPr>
+          <p:cNvPr id="5" name="Slide Number Placeholder 4"/>
+          <p:cNvSpPr>
+            <a:spLocks noGrp="1"/>
+          </p:cNvSpPr>
+          <p:nvPr>
+            <p:ph type="sldNum" sz="quarter" idx="12"/>
+          </p:nvPr>
+        </p:nvSpPr>
+        <p:spPr/>
+        <p:txBody>
+          <a:bodyPr/>
+          <a:lstStyle/>
+          <a:p>
+            <a:fld id="{29A7BD92-6AE5-CF43-B276-274952F2BFB4}" type="slidenum">
+              <a:rPr lang="en-US" smtClean="0"/>
+              <a:pPr/>
+              <a:t>2</a:t>
+            </a:fld>
+            <a:endParaRPr lang="en-US" dirty="0"/>
+          </a:p>
+        </p:txBody>
+      </p:sp>
+    </p:spTree>
+    <p:extLst>
+      <p:ext uri="{BB962C8B-B14F-4D97-AF65-F5344CB8AC3E}">
+        <p14:creationId xmlns:p14="http://schemas.microsoft.com/office/powerpoint/2010/main" val="246646530"/>
+      </p:ext>
+    </p:extLst>
+  </p:cSld>
+  <p:clrMapOvr>
+    <a:masterClrMapping/>
+  </p:clrMapOvr>
+  <p:transition spd="med">
+    <p:wipe/>
+  </p:transition>
+</p:sld>
+</file>
+
+<file path=ppt/slides/slide3.xml><?xml version="1.0" encoding="utf-8"?>
+<p:sld xmlns:a="http://schemas.openxmlformats.org/drawingml/2006/main" xmlns:r="http://schemas.openxmlformats.org/officeDocument/2006/relationships" xmlns:p="http://schemas.openxmlformats.org/presentationml/2006/main">
+  <p:cSld>
+    <p:spTree>
+      <p:nvGrpSpPr>
+        <p:cNvPr id="1" name=""/>
+        <p:cNvGrpSpPr/>
+        <p:nvPr/>
+      </p:nvGrpSpPr>
+      <p:grpSpPr>
+        <a:xfrm>
+          <a:off x="0" y="0"/>
+          <a:ext cx="0" cy="0"/>
+          <a:chOff x="0" y="0"/>
+          <a:chExt cx="0" cy="0"/>
+        </a:xfrm>
+      </p:grpSpPr>
+      <p:sp>
+        <p:nvSpPr>
+          <p:cNvPr id="2" name="Content Placeholder 1"/>
+          <p:cNvSpPr>
+            <a:spLocks noGrp="1"/>
+          </p:cNvSpPr>
+          <p:nvPr>
+            <p:ph idx="10"/>
+          </p:nvPr>
+        </p:nvSpPr>
+        <p:spPr/>
+        <p:txBody>
+          <a:bodyPr anchor="ctr">
+            <a:normAutofit/>
+          </a:bodyPr>
+          <a:lstStyle/>
+          <a:p>
+            <a:r>
+              <a:rPr lang="en-US" sz="2400" dirty="0" smtClean="0"/>
+              <a:t>I’ll talk a bit</a:t>
+            </a:r>
+          </a:p>
+          <a:p>
+            <a:r>
+              <a:rPr lang="en-US" sz="2400" dirty="0" smtClean="0"/>
+              <a:t>I’ll show a command window and type some commands</a:t>
+            </a:r>
+          </a:p>
+          <a:p>
+            <a:pPr lvl="1"/>
+            <a:r>
+              <a:rPr lang="en-US" sz="2000" dirty="0" smtClean="0"/>
+              <a:t>You’ll type the commands too</a:t>
+            </a:r>
+          </a:p>
+          <a:p>
+            <a:r>
+              <a:rPr lang="en-US" sz="2400" dirty="0" smtClean="0"/>
+              <a:t>You’ll earn your degree</a:t>
+            </a:r>
+            <a:endParaRPr lang="en-US" sz="2400" dirty="0"/>
+          </a:p>
+        </p:txBody>
+      </p:sp>
+      <p:sp>
+        <p:nvSpPr>
+          <p:cNvPr id="3" name="Title 2"/>
+          <p:cNvSpPr>
+            <a:spLocks noGrp="1"/>
+          </p:cNvSpPr>
+          <p:nvPr>
+            <p:ph type="title"/>
+          </p:nvPr>
+        </p:nvSpPr>
+        <p:spPr/>
+        <p:txBody>
+          <a:bodyPr/>
+          <a:lstStyle/>
+          <a:p>
+            <a:r>
+              <a:rPr lang="en-US" dirty="0"/>
+              <a:t>How </a:t>
+            </a:r>
+            <a:r>
+              <a:rPr lang="en-US" dirty="0" smtClean="0"/>
+              <a:t>This Is </a:t>
+            </a:r>
+            <a:r>
+              <a:rPr lang="en-US" dirty="0"/>
+              <a:t>Going to Work</a:t>
+            </a:r>
+          </a:p>
+        </p:txBody>
+      </p:sp>
+      <p:sp>
+        <p:nvSpPr>
+          <p:cNvPr id="4" name="Footer Placeholder 3"/>
+          <p:cNvSpPr>
+            <a:spLocks noGrp="1"/>
+          </p:cNvSpPr>
+          <p:nvPr>
+            <p:ph type="ftr" sz="quarter" idx="11"/>
+          </p:nvPr>
+        </p:nvSpPr>
+        <p:spPr/>
+        <p:txBody>
+          <a:bodyPr/>
+          <a:lstStyle/>
+          <a:p>
+            <a:r>
+              <a:rPr lang="en-US" smtClean="0"/>
+              <a:t>Silicon Labs Confidential</a:t>
+            </a:r>
+            <a:endParaRPr lang="en-US" dirty="0"/>
+          </a:p>
+        </p:txBody>
+      </p:sp>
+      <p:sp>
+        <p:nvSpPr>
+          <p:cNvPr id="5" name="Slide Number Placeholder 4"/>
+          <p:cNvSpPr>
+            <a:spLocks noGrp="1"/>
+          </p:cNvSpPr>
+          <p:nvPr>
+            <p:ph type="sldNum" sz="quarter" idx="12"/>
+          </p:nvPr>
+        </p:nvSpPr>
+        <p:spPr/>
+        <p:txBody>
+          <a:bodyPr/>
+          <a:lstStyle/>
+          <a:p>
+            <a:fld id="{29A7BD92-6AE5-CF43-B276-274952F2BFB4}" type="slidenum">
+              <a:rPr lang="en-US" smtClean="0"/>
+              <a:pPr/>
+              <a:t>3</a:t>
+            </a:fld>
+            <a:endParaRPr lang="en-US" dirty="0"/>
+          </a:p>
+        </p:txBody>
+      </p:sp>
+    </p:spTree>
+    <p:extLst>
+      <p:ext uri="{BB962C8B-B14F-4D97-AF65-F5344CB8AC3E}">
+        <p14:creationId xmlns:p14="http://schemas.microsoft.com/office/powerpoint/2010/main" val="3870545938"/>
+      </p:ext>
+    </p:extLst>
+  </p:cSld>
+  <p:clrMapOvr>
+    <a:masterClrMapping/>
+  </p:clrMapOvr>
+  <p:transition spd="med">
+    <p:wipe/>
+  </p:transition>
+</p:sld>
+</file>
+
+<file path=ppt/slides/slide4.xml><?xml version="1.0" encoding="utf-8"?>
+<p:sld xmlns:a="http://schemas.openxmlformats.org/drawingml/2006/main" xmlns:r="http://schemas.openxmlformats.org/officeDocument/2006/relationships" xmlns:p="http://schemas.openxmlformats.org/presentationml/2006/main">
+  <p:cSld>
+    <p:spTree>
+      <p:nvGrpSpPr>
+        <p:cNvPr id="1" name=""/>
+        <p:cNvGrpSpPr/>
+        <p:nvPr/>
+      </p:nvGrpSpPr>
+      <p:grpSpPr>
+        <a:xfrm>
+          <a:off x="0" y="0"/>
+          <a:ext cx="0" cy="0"/>
+          <a:chOff x="0" y="0"/>
+          <a:chExt cx="0" cy="0"/>
+        </a:xfrm>
+      </p:grpSpPr>
+      <p:sp>
+        <p:nvSpPr>
+          <p:cNvPr id="2" name="Content Placeholder 1"/>
+          <p:cNvSpPr>
+            <a:spLocks noGrp="1"/>
+          </p:cNvSpPr>
+          <p:nvPr>
+            <p:ph idx="10"/>
+          </p:nvPr>
+        </p:nvSpPr>
+        <p:spPr/>
+        <p:txBody>
+          <a:bodyPr>
+            <a:normAutofit/>
+          </a:bodyPr>
+          <a:lstStyle/>
+          <a:p>
+            <a:r>
+              <a:rPr lang="en-US" sz="2400" dirty="0" smtClean="0"/>
               <a:t>What is Git?</a:t>
             </a:r>
           </a:p>
           <a:p>
             <a:r>
-              <a:rPr lang="en-US" dirty="0" smtClean="0"/>
-              <a:t>Making a repository</a:t>
-            </a:r>
-          </a:p>
-          <a:p>
-            <a:r>
-              <a:rPr lang="en-US" dirty="0" smtClean="0"/>
+              <a:rPr lang="en-US" sz="2400" dirty="0" smtClean="0"/>
+              <a:t>Making a repository (also, what’s a repository?)</a:t>
+            </a:r>
+          </a:p>
+          <a:p>
+            <a:r>
+              <a:rPr lang="en-US" sz="2400" dirty="0" smtClean="0"/>
               <a:t>Tracking changes</a:t>
             </a:r>
           </a:p>
           <a:p>
             <a:r>
-              <a:rPr lang="en-US" dirty="0" smtClean="0"/>
+              <a:rPr lang="en-US" sz="2400" dirty="0" smtClean="0"/>
               <a:t>Undoing changes</a:t>
             </a:r>
           </a:p>
           <a:p>
-            <a:endParaRPr lang="en-US" dirty="0"/>
+            <a:r>
+              <a:rPr lang="en-US" sz="2400" dirty="0" smtClean="0"/>
+              <a:t>Experimenting with changes</a:t>
+            </a:r>
+          </a:p>
+          <a:p>
+            <a:r>
+              <a:rPr lang="en-US" sz="2400" dirty="0" smtClean="0"/>
+              <a:t>Merging changes</a:t>
+            </a:r>
+          </a:p>
+          <a:p>
+            <a:r>
+              <a:rPr lang="en-US" sz="2400" dirty="0" smtClean="0"/>
+              <a:t>Sharing changes</a:t>
+            </a:r>
+          </a:p>
+          <a:p>
+            <a:r>
+              <a:rPr lang="en-US" sz="2400" dirty="0" smtClean="0"/>
+              <a:t>Wrapping up: command showcase</a:t>
+            </a:r>
+          </a:p>
+          <a:p>
+            <a:endParaRPr lang="en-US" sz="2400" dirty="0"/>
           </a:p>
         </p:txBody>
       </p:sp>
@@ -15383,7 +15719,7 @@
             <a:fld id="{29A7BD92-6AE5-CF43-B276-274952F2BFB4}" type="slidenum">
               <a:rPr lang="en-US" smtClean="0"/>
               <a:pPr/>
-              <a:t>2</a:t>
+              <a:t>4</a:t>
             </a:fld>
             <a:endParaRPr lang="en-US" dirty="0"/>
           </a:p>
@@ -15402,6 +15738,438 @@
   <p:transition spd="med">
     <p:wipe/>
   </p:transition>
+  <p:timing>
+    <p:tnLst>
+      <p:par>
+        <p:cTn id="1" dur="indefinite" restart="never" nodeType="tmRoot"/>
+      </p:par>
+    </p:tnLst>
+  </p:timing>
+</p:sld>
+</file>
+
+<file path=ppt/slides/slide5.xml><?xml version="1.0" encoding="utf-8"?>
+<p:sld xmlns:a="http://schemas.openxmlformats.org/drawingml/2006/main" xmlns:r="http://schemas.openxmlformats.org/officeDocument/2006/relationships" xmlns:p="http://schemas.openxmlformats.org/presentationml/2006/main">
+  <p:cSld>
+    <p:spTree>
+      <p:nvGrpSpPr>
+        <p:cNvPr id="1" name=""/>
+        <p:cNvGrpSpPr/>
+        <p:nvPr/>
+      </p:nvGrpSpPr>
+      <p:grpSpPr>
+        <a:xfrm>
+          <a:off x="0" y="0"/>
+          <a:ext cx="0" cy="0"/>
+          <a:chOff x="0" y="0"/>
+          <a:chExt cx="0" cy="0"/>
+        </a:xfrm>
+      </p:grpSpPr>
+      <p:sp>
+        <p:nvSpPr>
+          <p:cNvPr id="4" name="Title 3"/>
+          <p:cNvSpPr>
+            <a:spLocks noGrp="1"/>
+          </p:cNvSpPr>
+          <p:nvPr>
+            <p:ph type="title"/>
+          </p:nvPr>
+        </p:nvSpPr>
+        <p:spPr/>
+        <p:txBody>
+          <a:bodyPr/>
+          <a:lstStyle/>
+          <a:p>
+            <a:r>
+              <a:rPr lang="en-US" dirty="0"/>
+              <a:t>Let's Get Started</a:t>
+            </a:r>
+          </a:p>
+        </p:txBody>
+      </p:sp>
+      <p:sp>
+        <p:nvSpPr>
+          <p:cNvPr id="5" name="Text Placeholder 4"/>
+          <p:cNvSpPr>
+            <a:spLocks noGrp="1"/>
+          </p:cNvSpPr>
+          <p:nvPr>
+            <p:ph type="body" sz="quarter" idx="11"/>
+          </p:nvPr>
+        </p:nvSpPr>
+        <p:spPr/>
+        <p:txBody>
+          <a:bodyPr/>
+          <a:lstStyle/>
+          <a:p>
+            <a:endParaRPr lang="en-US"/>
+          </a:p>
+        </p:txBody>
+      </p:sp>
+    </p:spTree>
+    <p:extLst>
+      <p:ext uri="{BB962C8B-B14F-4D97-AF65-F5344CB8AC3E}">
+        <p14:creationId xmlns:p14="http://schemas.microsoft.com/office/powerpoint/2010/main" val="319386383"/>
+      </p:ext>
+    </p:extLst>
+  </p:cSld>
+  <p:clrMapOvr>
+    <a:masterClrMapping/>
+  </p:clrMapOvr>
+  <p:transition spd="med">
+    <p:wipe/>
+  </p:transition>
+</p:sld>
+</file>
+
+<file path=ppt/slides/slide6.xml><?xml version="1.0" encoding="utf-8"?>
+<p:sld xmlns:a="http://schemas.openxmlformats.org/drawingml/2006/main" xmlns:r="http://schemas.openxmlformats.org/officeDocument/2006/relationships" xmlns:p="http://schemas.openxmlformats.org/presentationml/2006/main">
+  <p:cSld>
+    <p:spTree>
+      <p:nvGrpSpPr>
+        <p:cNvPr id="1" name=""/>
+        <p:cNvGrpSpPr/>
+        <p:nvPr/>
+      </p:nvGrpSpPr>
+      <p:grpSpPr>
+        <a:xfrm>
+          <a:off x="0" y="0"/>
+          <a:ext cx="0" cy="0"/>
+          <a:chOff x="0" y="0"/>
+          <a:chExt cx="0" cy="0"/>
+        </a:xfrm>
+      </p:grpSpPr>
+      <p:sp>
+        <p:nvSpPr>
+          <p:cNvPr id="2" name="Content Placeholder 1"/>
+          <p:cNvSpPr>
+            <a:spLocks noGrp="1"/>
+          </p:cNvSpPr>
+          <p:nvPr>
+            <p:ph idx="10"/>
+          </p:nvPr>
+        </p:nvSpPr>
+        <p:spPr/>
+        <p:txBody>
+          <a:bodyPr>
+            <a:normAutofit/>
+          </a:bodyPr>
+          <a:lstStyle/>
+          <a:p>
+            <a:r>
+              <a:rPr lang="en-US" sz="2400" dirty="0" smtClean="0"/>
+              <a:t>Git helps you keep track of files</a:t>
+            </a:r>
+          </a:p>
+          <a:p>
+            <a:r>
+              <a:rPr lang="en-US" sz="2400" dirty="0" smtClean="0"/>
+              <a:t>Git helps you keep track of changes to files</a:t>
+            </a:r>
+          </a:p>
+          <a:p>
+            <a:r>
+              <a:rPr lang="en-US" sz="2400" dirty="0" smtClean="0"/>
+              <a:t>It’s fully decentralized</a:t>
+            </a:r>
+          </a:p>
+          <a:p>
+            <a:r>
+              <a:rPr lang="en-US" sz="2400" dirty="0" smtClean="0"/>
+              <a:t>It makes experimenting easy</a:t>
+            </a:r>
+          </a:p>
+          <a:p>
+            <a:r>
+              <a:rPr lang="en-US" sz="2400" dirty="0" smtClean="0"/>
+              <a:t>It helps protect you from yourself and others</a:t>
+            </a:r>
+            <a:endParaRPr lang="en-US" sz="2400" dirty="0"/>
+          </a:p>
+        </p:txBody>
+      </p:sp>
+      <p:sp>
+        <p:nvSpPr>
+          <p:cNvPr id="3" name="Title 2"/>
+          <p:cNvSpPr>
+            <a:spLocks noGrp="1"/>
+          </p:cNvSpPr>
+          <p:nvPr>
+            <p:ph type="title"/>
+          </p:nvPr>
+        </p:nvSpPr>
+        <p:spPr/>
+        <p:txBody>
+          <a:bodyPr/>
+          <a:lstStyle/>
+          <a:p>
+            <a:r>
+              <a:rPr lang="en-US" dirty="0" smtClean="0"/>
+              <a:t>What is Git?</a:t>
+            </a:r>
+            <a:endParaRPr lang="en-US" dirty="0"/>
+          </a:p>
+        </p:txBody>
+      </p:sp>
+      <p:sp>
+        <p:nvSpPr>
+          <p:cNvPr id="4" name="Footer Placeholder 3"/>
+          <p:cNvSpPr>
+            <a:spLocks noGrp="1"/>
+          </p:cNvSpPr>
+          <p:nvPr>
+            <p:ph type="ftr" sz="quarter" idx="11"/>
+          </p:nvPr>
+        </p:nvSpPr>
+        <p:spPr/>
+        <p:txBody>
+          <a:bodyPr/>
+          <a:lstStyle/>
+          <a:p>
+            <a:r>
+              <a:rPr lang="en-US" smtClean="0"/>
+              <a:t>Silicon Labs Confidential</a:t>
+            </a:r>
+            <a:endParaRPr lang="en-US" dirty="0"/>
+          </a:p>
+        </p:txBody>
+      </p:sp>
+      <p:sp>
+        <p:nvSpPr>
+          <p:cNvPr id="5" name="Slide Number Placeholder 4"/>
+          <p:cNvSpPr>
+            <a:spLocks noGrp="1"/>
+          </p:cNvSpPr>
+          <p:nvPr>
+            <p:ph type="sldNum" sz="quarter" idx="12"/>
+          </p:nvPr>
+        </p:nvSpPr>
+        <p:spPr/>
+        <p:txBody>
+          <a:bodyPr/>
+          <a:lstStyle/>
+          <a:p>
+            <a:fld id="{29A7BD92-6AE5-CF43-B276-274952F2BFB4}" type="slidenum">
+              <a:rPr lang="en-US" smtClean="0"/>
+              <a:pPr/>
+              <a:t>6</a:t>
+            </a:fld>
+            <a:endParaRPr lang="en-US" dirty="0"/>
+          </a:p>
+        </p:txBody>
+      </p:sp>
+    </p:spTree>
+    <p:extLst>
+      <p:ext uri="{BB962C8B-B14F-4D97-AF65-F5344CB8AC3E}">
+        <p14:creationId xmlns:p14="http://schemas.microsoft.com/office/powerpoint/2010/main" val="50188034"/>
+      </p:ext>
+    </p:extLst>
+  </p:cSld>
+  <p:clrMapOvr>
+    <a:masterClrMapping/>
+  </p:clrMapOvr>
+  <p:transition spd="med">
+    <p:wipe/>
+  </p:transition>
+</p:sld>
+</file>
+
+<file path=ppt/slides/slide7.xml><?xml version="1.0" encoding="utf-8"?>
+<p:sld xmlns:a="http://schemas.openxmlformats.org/drawingml/2006/main" xmlns:r="http://schemas.openxmlformats.org/officeDocument/2006/relationships" xmlns:p="http://schemas.openxmlformats.org/presentationml/2006/main">
+  <p:cSld>
+    <p:spTree>
+      <p:nvGrpSpPr>
+        <p:cNvPr id="1" name=""/>
+        <p:cNvGrpSpPr/>
+        <p:nvPr/>
+      </p:nvGrpSpPr>
+      <p:grpSpPr>
+        <a:xfrm>
+          <a:off x="0" y="0"/>
+          <a:ext cx="0" cy="0"/>
+          <a:chOff x="0" y="0"/>
+          <a:chExt cx="0" cy="0"/>
+        </a:xfrm>
+      </p:grpSpPr>
+      <p:sp>
+        <p:nvSpPr>
+          <p:cNvPr id="14" name="Title 13"/>
+          <p:cNvSpPr>
+            <a:spLocks noGrp="1"/>
+          </p:cNvSpPr>
+          <p:nvPr>
+            <p:ph type="title"/>
+          </p:nvPr>
+        </p:nvSpPr>
+        <p:spPr/>
+        <p:txBody>
+          <a:bodyPr/>
+          <a:lstStyle/>
+          <a:p>
+            <a:r>
+              <a:rPr lang="en-US" dirty="0" smtClean="0"/>
+              <a:t>Making A Repository</a:t>
+            </a:r>
+            <a:endParaRPr lang="en-US" dirty="0"/>
+          </a:p>
+        </p:txBody>
+      </p:sp>
+      <p:sp>
+        <p:nvSpPr>
+          <p:cNvPr id="16" name="Picture Placeholder 15"/>
+          <p:cNvSpPr>
+            <a:spLocks noGrp="1"/>
+          </p:cNvSpPr>
+          <p:nvPr>
+            <p:ph type="pic" sz="quarter" idx="15"/>
+          </p:nvPr>
+        </p:nvSpPr>
+        <p:spPr/>
+      </p:sp>
+      <p:sp>
+        <p:nvSpPr>
+          <p:cNvPr id="15" name="Content Placeholder 14"/>
+          <p:cNvSpPr>
+            <a:spLocks noGrp="1"/>
+          </p:cNvSpPr>
+          <p:nvPr>
+            <p:ph sz="quarter" idx="13"/>
+          </p:nvPr>
+        </p:nvSpPr>
+        <p:spPr/>
+        <p:txBody>
+          <a:bodyPr>
+            <a:normAutofit/>
+          </a:bodyPr>
+          <a:lstStyle/>
+          <a:p>
+            <a:r>
+              <a:rPr lang="en-US" sz="2400" dirty="0" smtClean="0">
+                <a:ea typeface="Anonymous Pro" panose="02060609030202000504" pitchFamily="49" charset="0"/>
+              </a:rPr>
+              <a:t>Repository: all the folders and files you want </a:t>
+            </a:r>
+            <a:r>
+              <a:rPr lang="en-US" sz="2400" dirty="0" err="1" smtClean="0">
+                <a:ea typeface="Anonymous Pro" panose="02060609030202000504" pitchFamily="49" charset="0"/>
+              </a:rPr>
+              <a:t>git</a:t>
+            </a:r>
+            <a:r>
+              <a:rPr lang="en-US" sz="2400" dirty="0" smtClean="0">
+                <a:ea typeface="Anonymous Pro" panose="02060609030202000504" pitchFamily="49" charset="0"/>
+              </a:rPr>
+              <a:t> to track</a:t>
+            </a:r>
+          </a:p>
+          <a:p>
+            <a:r>
+              <a:rPr lang="en-US" sz="2400" dirty="0" err="1" smtClean="0">
+                <a:solidFill>
+                  <a:schemeClr val="tx2"/>
+                </a:solidFill>
+                <a:latin typeface="Anonymous Pro" panose="02060609030202000504" pitchFamily="49" charset="0"/>
+                <a:ea typeface="Anonymous Pro" panose="02060609030202000504" pitchFamily="49" charset="0"/>
+              </a:rPr>
+              <a:t>git</a:t>
+            </a:r>
+            <a:r>
+              <a:rPr lang="en-US" sz="2400" dirty="0" smtClean="0">
+                <a:solidFill>
+                  <a:schemeClr val="tx2"/>
+                </a:solidFill>
+                <a:latin typeface="Anonymous Pro" panose="02060609030202000504" pitchFamily="49" charset="0"/>
+                <a:ea typeface="Anonymous Pro" panose="02060609030202000504" pitchFamily="49" charset="0"/>
+              </a:rPr>
+              <a:t> </a:t>
+            </a:r>
+            <a:r>
+              <a:rPr lang="en-US" sz="2400" dirty="0" err="1">
+                <a:solidFill>
+                  <a:schemeClr val="tx2"/>
+                </a:solidFill>
+                <a:latin typeface="Anonymous Pro" panose="02060609030202000504" pitchFamily="49" charset="0"/>
+                <a:ea typeface="Anonymous Pro" panose="02060609030202000504" pitchFamily="49" charset="0"/>
+              </a:rPr>
+              <a:t>init</a:t>
+            </a:r>
+            <a:endParaRPr lang="en-US" sz="2400" dirty="0">
+              <a:solidFill>
+                <a:schemeClr val="tx2"/>
+              </a:solidFill>
+              <a:latin typeface="Anonymous Pro" panose="02060609030202000504" pitchFamily="49" charset="0"/>
+              <a:ea typeface="Anonymous Pro" panose="02060609030202000504" pitchFamily="49" charset="0"/>
+            </a:endParaRPr>
+          </a:p>
+        </p:txBody>
+      </p:sp>
+      <p:sp>
+        <p:nvSpPr>
+          <p:cNvPr id="4" name="Footer Placeholder 3"/>
+          <p:cNvSpPr>
+            <a:spLocks noGrp="1"/>
+          </p:cNvSpPr>
+          <p:nvPr>
+            <p:ph type="ftr" sz="quarter" idx="16"/>
+          </p:nvPr>
+        </p:nvSpPr>
+        <p:spPr/>
+        <p:txBody>
+          <a:bodyPr/>
+          <a:lstStyle/>
+          <a:p>
+            <a:r>
+              <a:rPr lang="en-US" smtClean="0"/>
+              <a:t>Silicon Labs Confidential</a:t>
+            </a:r>
+            <a:endParaRPr lang="en-US" dirty="0"/>
+          </a:p>
+        </p:txBody>
+      </p:sp>
+      <p:sp>
+        <p:nvSpPr>
+          <p:cNvPr id="5" name="Slide Number Placeholder 4"/>
+          <p:cNvSpPr>
+            <a:spLocks noGrp="1"/>
+          </p:cNvSpPr>
+          <p:nvPr>
+            <p:ph type="sldNum" sz="quarter" idx="17"/>
+          </p:nvPr>
+        </p:nvSpPr>
+        <p:spPr/>
+        <p:txBody>
+          <a:bodyPr/>
+          <a:lstStyle/>
+          <a:p>
+            <a:fld id="{29A7BD92-6AE5-CF43-B276-274952F2BFB4}" type="slidenum">
+              <a:rPr lang="en-US" smtClean="0"/>
+              <a:pPr/>
+              <a:t>7</a:t>
+            </a:fld>
+            <a:endParaRPr lang="en-US" dirty="0"/>
+          </a:p>
+        </p:txBody>
+      </p:sp>
+    </p:spTree>
+    <p:extLst>
+      <p:ext uri="{BB962C8B-B14F-4D97-AF65-F5344CB8AC3E}">
+        <p14:creationId xmlns:p14="http://schemas.microsoft.com/office/powerpoint/2010/main" val="1651991502"/>
+      </p:ext>
+    </p:extLst>
+  </p:cSld>
+  <p:clrMapOvr>
+    <a:masterClrMapping/>
+  </p:clrMapOvr>
+  <p:transition spd="med">
+    <p:wipe/>
+  </p:transition>
+  <p:timing>
+    <p:tnLst>
+      <p:par>
+        <p:cTn id="1" dur="indefinite" restart="never" nodeType="tmRoot"/>
+      </p:par>
+    </p:tnLst>
+  </p:timing>
 </p:sld>
 </file>
 

</xml_diff>

<commit_message>
Added the source for the remote repo picture
</commit_message>
<xml_diff>
--- a/Git The Hard Way.pptx
+++ b/Git The Hard Way.pptx
@@ -18755,6 +18755,40 @@
           </a:prstGeom>
         </p:spPr>
       </p:pic>
+      <p:sp>
+        <p:nvSpPr>
+          <p:cNvPr id="10" name="Rectangle 9">
+            <a:extLst>
+              <a:ext uri="{FF2B5EF4-FFF2-40B4-BE49-F238E27FC236}">
+                <a16:creationId xmlns:a16="http://schemas.microsoft.com/office/drawing/2014/main" id="{8E305396-6880-4EE1-97ED-DE7ABAC9B4E5}"/>
+              </a:ext>
+            </a:extLst>
+          </p:cNvPr>
+          <p:cNvSpPr/>
+          <p:nvPr/>
+        </p:nvSpPr>
+        <p:spPr>
+          <a:xfrm>
+            <a:off x="2140259" y="5730329"/>
+            <a:ext cx="3190361" cy="276999"/>
+          </a:xfrm>
+          <a:prstGeom prst="rect">
+            <a:avLst/>
+          </a:prstGeom>
+        </p:spPr>
+        <p:txBody>
+          <a:bodyPr wrap="none">
+            <a:spAutoFit/>
+          </a:bodyPr>
+          <a:lstStyle/>
+          <a:p>
+            <a:r>
+              <a:rPr lang="en-US" sz="1200" dirty="0"/>
+              <a:t>https://www.atlassian.com/git/tutorials/syncing</a:t>
+            </a:r>
+          </a:p>
+        </p:txBody>
+      </p:sp>
     </p:spTree>
     <p:extLst>
       <p:ext uri="{BB962C8B-B14F-4D97-AF65-F5344CB8AC3E}">

</xml_diff>

<commit_message>
Added a complete image for the decentralized workflow
</commit_message>
<xml_diff>
--- a/Git The Hard Way.pptx
+++ b/Git The Hard Way.pptx
@@ -36,8 +36,9 @@
     <p:sldId id="287" r:id="rId30"/>
     <p:sldId id="288" r:id="rId31"/>
     <p:sldId id="289" r:id="rId32"/>
-    <p:sldId id="281" r:id="rId33"/>
-    <p:sldId id="280" r:id="rId34"/>
+    <p:sldId id="290" r:id="rId33"/>
+    <p:sldId id="281" r:id="rId34"/>
+    <p:sldId id="280" r:id="rId35"/>
   </p:sldIdLst>
   <p:sldSz cx="12192000" cy="6858000"/>
   <p:notesSz cx="7010400" cy="9296400"/>
@@ -19928,10 +19929,10 @@
       </p:grpSpPr>
       <p:sp>
         <p:nvSpPr>
-          <p:cNvPr id="4" name="Title 3">
+          <p:cNvPr id="8" name="Content Placeholder 7">
             <a:extLst>
               <a:ext uri="{FF2B5EF4-FFF2-40B4-BE49-F238E27FC236}">
-                <a16:creationId xmlns:a16="http://schemas.microsoft.com/office/drawing/2014/main" id="{A29ACE7D-3249-4DC5-8EC2-E682B497B9B4}"/>
+                <a16:creationId xmlns:a16="http://schemas.microsoft.com/office/drawing/2014/main" id="{C95EB5DF-7DD9-42BA-8D51-4AD56B5FF604}"/>
               </a:ext>
             </a:extLst>
           </p:cNvPr>
@@ -19939,7 +19940,7 @@
             <a:spLocks noGrp="1"/>
           </p:cNvSpPr>
           <p:nvPr>
-            <p:ph type="title"/>
+            <p:ph idx="10"/>
           </p:nvPr>
         </p:nvSpPr>
         <p:spPr/>
@@ -19947,19 +19948,16 @@
           <a:bodyPr/>
           <a:lstStyle/>
           <a:p>
-            <a:r>
-              <a:rPr lang="en-US" dirty="0"/>
-              <a:t>Fin</a:t>
-            </a:r>
-          </a:p>
-        </p:txBody>
-      </p:sp>
-      <p:sp>
-        <p:nvSpPr>
-          <p:cNvPr id="5" name="Text Placeholder 4">
+            <a:endParaRPr lang="en-US" dirty="0"/>
+          </a:p>
+        </p:txBody>
+      </p:sp>
+      <p:sp>
+        <p:nvSpPr>
+          <p:cNvPr id="7" name="Title 6">
             <a:extLst>
               <a:ext uri="{FF2B5EF4-FFF2-40B4-BE49-F238E27FC236}">
-                <a16:creationId xmlns:a16="http://schemas.microsoft.com/office/drawing/2014/main" id="{604CFBF1-D149-4A19-87F6-539F2FED4AE8}"/>
+                <a16:creationId xmlns:a16="http://schemas.microsoft.com/office/drawing/2014/main" id="{D1D781D7-38FD-4142-A43B-B01D2FD2B5C5}"/>
               </a:ext>
             </a:extLst>
           </p:cNvPr>
@@ -19967,7 +19965,7 @@
             <a:spLocks noGrp="1"/>
           </p:cNvSpPr>
           <p:nvPr>
-            <p:ph type="body" sz="quarter" idx="11"/>
+            <p:ph type="title"/>
           </p:nvPr>
         </p:nvSpPr>
         <p:spPr/>
@@ -19975,14 +19973,106 @@
           <a:bodyPr/>
           <a:lstStyle/>
           <a:p>
-            <a:endParaRPr lang="en-US"/>
-          </a:p>
-        </p:txBody>
-      </p:sp>
+            <a:r>
+              <a:rPr lang="en-US" dirty="0"/>
+              <a:t>The Full Picture</a:t>
+            </a:r>
+          </a:p>
+        </p:txBody>
+      </p:sp>
+      <p:sp>
+        <p:nvSpPr>
+          <p:cNvPr id="5" name="Footer Placeholder 4">
+            <a:extLst>
+              <a:ext uri="{FF2B5EF4-FFF2-40B4-BE49-F238E27FC236}">
+                <a16:creationId xmlns:a16="http://schemas.microsoft.com/office/drawing/2014/main" id="{8EE2714B-923D-4D0B-B71B-CF963EF022F1}"/>
+              </a:ext>
+            </a:extLst>
+          </p:cNvPr>
+          <p:cNvSpPr>
+            <a:spLocks noGrp="1"/>
+          </p:cNvSpPr>
+          <p:nvPr>
+            <p:ph type="ftr" sz="quarter" idx="11"/>
+          </p:nvPr>
+        </p:nvSpPr>
+        <p:spPr/>
+        <p:txBody>
+          <a:bodyPr/>
+          <a:lstStyle/>
+          <a:p>
+            <a:r>
+              <a:rPr lang="en-US"/>
+              <a:t>Silicon Labs Confidential</a:t>
+            </a:r>
+            <a:endParaRPr lang="en-US" dirty="0"/>
+          </a:p>
+        </p:txBody>
+      </p:sp>
+      <p:sp>
+        <p:nvSpPr>
+          <p:cNvPr id="6" name="Slide Number Placeholder 5">
+            <a:extLst>
+              <a:ext uri="{FF2B5EF4-FFF2-40B4-BE49-F238E27FC236}">
+                <a16:creationId xmlns:a16="http://schemas.microsoft.com/office/drawing/2014/main" id="{4376A03B-91DD-4E5B-BCCB-15B219BDD8F5}"/>
+              </a:ext>
+            </a:extLst>
+          </p:cNvPr>
+          <p:cNvSpPr>
+            <a:spLocks noGrp="1"/>
+          </p:cNvSpPr>
+          <p:nvPr>
+            <p:ph type="sldNum" sz="quarter" idx="12"/>
+          </p:nvPr>
+        </p:nvSpPr>
+        <p:spPr/>
+        <p:txBody>
+          <a:bodyPr/>
+          <a:lstStyle/>
+          <a:p>
+            <a:fld id="{29A7BD92-6AE5-CF43-B276-274952F2BFB4}" type="slidenum">
+              <a:rPr lang="en-US" smtClean="0"/>
+              <a:pPr/>
+              <a:t>32</a:t>
+            </a:fld>
+            <a:endParaRPr lang="en-US" dirty="0"/>
+          </a:p>
+        </p:txBody>
+      </p:sp>
+      <p:pic>
+        <p:nvPicPr>
+          <p:cNvPr id="13" name="Picture 12">
+            <a:extLst>
+              <a:ext uri="{FF2B5EF4-FFF2-40B4-BE49-F238E27FC236}">
+                <a16:creationId xmlns:a16="http://schemas.microsoft.com/office/drawing/2014/main" id="{33EC8D5B-9D7F-4E30-A6CB-A04988EFB20F}"/>
+              </a:ext>
+            </a:extLst>
+          </p:cNvPr>
+          <p:cNvPicPr>
+            <a:picLocks noChangeAspect="1"/>
+          </p:cNvPicPr>
+          <p:nvPr/>
+        </p:nvPicPr>
+        <p:blipFill>
+          <a:blip r:embed="rId2"/>
+          <a:stretch>
+            <a:fillRect/>
+          </a:stretch>
+        </p:blipFill>
+        <p:spPr>
+          <a:xfrm>
+            <a:off x="3409207" y="1138534"/>
+            <a:ext cx="5373586" cy="5038132"/>
+          </a:xfrm>
+          <a:prstGeom prst="rect">
+            <a:avLst/>
+          </a:prstGeom>
+        </p:spPr>
+      </p:pic>
     </p:spTree>
     <p:extLst>
       <p:ext uri="{BB962C8B-B14F-4D97-AF65-F5344CB8AC3E}">
-        <p14:creationId xmlns:p14="http://schemas.microsoft.com/office/powerpoint/2010/main" val="2080330869"/>
+        <p14:creationId xmlns:p14="http://schemas.microsoft.com/office/powerpoint/2010/main" val="1457179530"/>
       </p:ext>
     </p:extLst>
   </p:cSld>
@@ -20014,6 +20104,92 @@
       </p:grpSpPr>
       <p:sp>
         <p:nvSpPr>
+          <p:cNvPr id="4" name="Title 3">
+            <a:extLst>
+              <a:ext uri="{FF2B5EF4-FFF2-40B4-BE49-F238E27FC236}">
+                <a16:creationId xmlns:a16="http://schemas.microsoft.com/office/drawing/2014/main" id="{A29ACE7D-3249-4DC5-8EC2-E682B497B9B4}"/>
+              </a:ext>
+            </a:extLst>
+          </p:cNvPr>
+          <p:cNvSpPr>
+            <a:spLocks noGrp="1"/>
+          </p:cNvSpPr>
+          <p:nvPr>
+            <p:ph type="title"/>
+          </p:nvPr>
+        </p:nvSpPr>
+        <p:spPr/>
+        <p:txBody>
+          <a:bodyPr/>
+          <a:lstStyle/>
+          <a:p>
+            <a:r>
+              <a:rPr lang="en-US" dirty="0"/>
+              <a:t>Fin</a:t>
+            </a:r>
+          </a:p>
+        </p:txBody>
+      </p:sp>
+      <p:sp>
+        <p:nvSpPr>
+          <p:cNvPr id="5" name="Text Placeholder 4">
+            <a:extLst>
+              <a:ext uri="{FF2B5EF4-FFF2-40B4-BE49-F238E27FC236}">
+                <a16:creationId xmlns:a16="http://schemas.microsoft.com/office/drawing/2014/main" id="{604CFBF1-D149-4A19-87F6-539F2FED4AE8}"/>
+              </a:ext>
+            </a:extLst>
+          </p:cNvPr>
+          <p:cNvSpPr>
+            <a:spLocks noGrp="1"/>
+          </p:cNvSpPr>
+          <p:nvPr>
+            <p:ph type="body" sz="quarter" idx="11"/>
+          </p:nvPr>
+        </p:nvSpPr>
+        <p:spPr/>
+        <p:txBody>
+          <a:bodyPr/>
+          <a:lstStyle/>
+          <a:p>
+            <a:endParaRPr lang="en-US"/>
+          </a:p>
+        </p:txBody>
+      </p:sp>
+    </p:spTree>
+    <p:extLst>
+      <p:ext uri="{BB962C8B-B14F-4D97-AF65-F5344CB8AC3E}">
+        <p14:creationId xmlns:p14="http://schemas.microsoft.com/office/powerpoint/2010/main" val="2080330869"/>
+      </p:ext>
+    </p:extLst>
+  </p:cSld>
+  <p:clrMapOvr>
+    <a:masterClrMapping/>
+  </p:clrMapOvr>
+  <p:transition spd="med">
+    <p:wipe/>
+  </p:transition>
+</p:sld>
+</file>
+
+<file path=ppt/slides/slide34.xml><?xml version="1.0" encoding="utf-8"?>
+<p:sld xmlns:a="http://schemas.openxmlformats.org/drawingml/2006/main" xmlns:r="http://schemas.openxmlformats.org/officeDocument/2006/relationships" xmlns:p="http://schemas.openxmlformats.org/presentationml/2006/main">
+  <p:cSld>
+    <p:spTree>
+      <p:nvGrpSpPr>
+        <p:cNvPr id="1" name=""/>
+        <p:cNvGrpSpPr/>
+        <p:nvPr/>
+      </p:nvGrpSpPr>
+      <p:grpSpPr>
+        <a:xfrm>
+          <a:off x="0" y="0"/>
+          <a:ext cx="0" cy="0"/>
+          <a:chOff x="0" y="0"/>
+          <a:chExt cx="0" cy="0"/>
+        </a:xfrm>
+      </p:grpSpPr>
+      <p:sp>
+        <p:nvSpPr>
           <p:cNvPr id="8" name="Content Placeholder 7">
             <a:extLst>
               <a:ext uri="{FF2B5EF4-FFF2-40B4-BE49-F238E27FC236}">
@@ -20118,7 +20294,7 @@
             <a:fld id="{29A7BD92-6AE5-CF43-B276-274952F2BFB4}" type="slidenum">
               <a:rPr lang="en-US" smtClean="0"/>
               <a:pPr/>
-              <a:t>33</a:t>
+              <a:t>34</a:t>
             </a:fld>
             <a:endParaRPr lang="en-US" dirty="0"/>
           </a:p>

</xml_diff>